<commit_message>
Figure 3: panel tags to uppercase
</commit_message>
<xml_diff>
--- a/Results/Figures/figure_03.pptx
+++ b/Results/Figures/figure_03.pptx
@@ -123,14 +123,6 @@
 </p:presentation>
 </file>
 
-<file path=ppt/revisionInfo.xml><?xml version="1.0" encoding="utf-8"?>
-<p1510:revInfo xmlns:a="http://schemas.openxmlformats.org/drawingml/2006/main" xmlns:r="http://schemas.openxmlformats.org/officeDocument/2006/relationships" xmlns:p1510="http://schemas.microsoft.com/office/powerpoint/2015/10/main">
-  <p1510:revLst>
-    <p1510:client id="{9561989A-6F4B-49C8-AB3D-2F38768059CC}" v="103" dt="2024-11-20T21:06:15.564"/>
-  </p1510:revLst>
-</p1510:revInfo>
-</file>
-
 <file path=ppt/changesInfos/changesInfo1.xml><?xml version="1.0" encoding="utf-8"?>
 <pc:chgInfo xmlns:a="http://schemas.openxmlformats.org/drawingml/2006/main" xmlns:r="http://schemas.openxmlformats.org/officeDocument/2006/relationships" xmlns:ac="http://schemas.microsoft.com/office/drawing/2013/main/command" xmlns:pc="http://schemas.microsoft.com/office/powerpoint/2013/main/command">
   <pc:docChgLst>
@@ -162,30 +154,6 @@
             <ac:spMk id="45" creationId="{3C2ABE41-10A5-70FD-8685-6D280AD1D057}"/>
           </ac:spMkLst>
         </pc:spChg>
-        <pc:spChg chg="mod">
-          <ac:chgData name="Gilbert, Neil" userId="37be9f5c-8f28-415b-96d6-624acf93bb3f" providerId="ADAL" clId="{9561989A-6F4B-49C8-AB3D-2F38768059CC}" dt="2024-11-20T15:44:10.456" v="78" actId="478"/>
-          <ac:spMkLst>
-            <pc:docMk/>
-            <pc:sldMk cId="268507922" sldId="256"/>
-            <ac:spMk id="62" creationId="{133F10ED-44CE-B5CD-46F0-631A8C237167}"/>
-          </ac:spMkLst>
-        </pc:spChg>
-        <pc:spChg chg="mod">
-          <ac:chgData name="Gilbert, Neil" userId="37be9f5c-8f28-415b-96d6-624acf93bb3f" providerId="ADAL" clId="{9561989A-6F4B-49C8-AB3D-2F38768059CC}" dt="2024-11-20T20:35:06.056" v="206" actId="1076"/>
-          <ac:spMkLst>
-            <pc:docMk/>
-            <pc:sldMk cId="268507922" sldId="256"/>
-            <ac:spMk id="63" creationId="{3C2ABE41-10A5-70FD-8685-6D280AD1D057}"/>
-          </ac:spMkLst>
-        </pc:spChg>
-        <pc:grpChg chg="add del mod">
-          <ac:chgData name="Gilbert, Neil" userId="37be9f5c-8f28-415b-96d6-624acf93bb3f" providerId="ADAL" clId="{9561989A-6F4B-49C8-AB3D-2F38768059CC}" dt="2024-11-20T20:39:03.312" v="225" actId="21"/>
-          <ac:grpSpMkLst>
-            <pc:docMk/>
-            <pc:sldMk cId="268507922" sldId="256"/>
-            <ac:grpSpMk id="33" creationId="{A4C7BBD9-C2A6-B388-60CB-AD1C5070D4BE}"/>
-          </ac:grpSpMkLst>
-        </pc:grpChg>
         <pc:grpChg chg="add mod">
           <ac:chgData name="Gilbert, Neil" userId="37be9f5c-8f28-415b-96d6-624acf93bb3f" providerId="ADAL" clId="{9561989A-6F4B-49C8-AB3D-2F38768059CC}" dt="2024-11-20T20:39:16.894" v="226"/>
           <ac:grpSpMkLst>
@@ -202,204 +170,12 @@
             <ac:grpSpMk id="37" creationId="{562DC42B-5422-8577-CD41-8D6CEDF2E8CC}"/>
           </ac:grpSpMkLst>
         </pc:grpChg>
-        <pc:grpChg chg="add del mod">
-          <ac:chgData name="Gilbert, Neil" userId="37be9f5c-8f28-415b-96d6-624acf93bb3f" providerId="ADAL" clId="{9561989A-6F4B-49C8-AB3D-2F38768059CC}" dt="2024-11-20T20:36:52.555" v="224" actId="164"/>
-          <ac:grpSpMkLst>
-            <pc:docMk/>
-            <pc:sldMk cId="268507922" sldId="256"/>
-            <ac:grpSpMk id="60" creationId="{562DC42B-5422-8577-CD41-8D6CEDF2E8CC}"/>
-          </ac:grpSpMkLst>
-        </pc:grpChg>
-        <pc:grpChg chg="del mod">
-          <ac:chgData name="Gilbert, Neil" userId="37be9f5c-8f28-415b-96d6-624acf93bb3f" providerId="ADAL" clId="{9561989A-6F4B-49C8-AB3D-2F38768059CC}" dt="2024-11-20T15:44:10.456" v="78" actId="478"/>
-          <ac:grpSpMkLst>
-            <pc:docMk/>
-            <pc:sldMk cId="268507922" sldId="256"/>
-            <ac:grpSpMk id="61" creationId="{1D031098-2056-772E-F1E0-AA1341525C8C}"/>
-          </ac:grpSpMkLst>
-        </pc:grpChg>
-        <pc:grpChg chg="del mod">
-          <ac:chgData name="Gilbert, Neil" userId="37be9f5c-8f28-415b-96d6-624acf93bb3f" providerId="ADAL" clId="{9561989A-6F4B-49C8-AB3D-2F38768059CC}" dt="2024-11-20T15:44:06.040" v="74" actId="478"/>
-          <ac:grpSpMkLst>
-            <pc:docMk/>
-            <pc:sldMk cId="268507922" sldId="256"/>
-            <ac:grpSpMk id="1025" creationId="{4A70BDE3-9296-8FFD-ADA3-7DA0BA0C32E7}"/>
-          </ac:grpSpMkLst>
-        </pc:grpChg>
-        <pc:grpChg chg="del mod">
-          <ac:chgData name="Gilbert, Neil" userId="37be9f5c-8f28-415b-96d6-624acf93bb3f" providerId="ADAL" clId="{9561989A-6F4B-49C8-AB3D-2F38768059CC}" dt="2024-11-20T15:44:09.386" v="77" actId="478"/>
-          <ac:grpSpMkLst>
-            <pc:docMk/>
-            <pc:sldMk cId="268507922" sldId="256"/>
-            <ac:grpSpMk id="1029" creationId="{8B9CC6C8-921A-8566-0464-FADB53374467}"/>
-          </ac:grpSpMkLst>
-        </pc:grpChg>
-        <pc:picChg chg="add del mod ord modCrop">
-          <ac:chgData name="Gilbert, Neil" userId="37be9f5c-8f28-415b-96d6-624acf93bb3f" providerId="ADAL" clId="{9561989A-6F4B-49C8-AB3D-2F38768059CC}" dt="2024-11-20T16:35:59.219" v="133" actId="478"/>
-          <ac:picMkLst>
-            <pc:docMk/>
-            <pc:sldMk cId="268507922" sldId="256"/>
-            <ac:picMk id="3" creationId="{29FF11E1-B737-01C1-9B91-F41530AB31EC}"/>
-          </ac:picMkLst>
-        </pc:picChg>
-        <pc:picChg chg="add del mod">
-          <ac:chgData name="Gilbert, Neil" userId="37be9f5c-8f28-415b-96d6-624acf93bb3f" providerId="ADAL" clId="{9561989A-6F4B-49C8-AB3D-2F38768059CC}" dt="2024-11-20T15:44:11.271" v="79" actId="478"/>
-          <ac:picMkLst>
-            <pc:docMk/>
-            <pc:sldMk cId="268507922" sldId="256"/>
-            <ac:picMk id="4" creationId="{73837819-AEEE-9DFE-DED9-A4E95A3380EA}"/>
-          </ac:picMkLst>
-        </pc:picChg>
-        <pc:picChg chg="add mod">
-          <ac:chgData name="Gilbert, Neil" userId="37be9f5c-8f28-415b-96d6-624acf93bb3f" providerId="ADAL" clId="{9561989A-6F4B-49C8-AB3D-2F38768059CC}" dt="2024-11-20T20:36:52.555" v="224" actId="164"/>
-          <ac:picMkLst>
-            <pc:docMk/>
-            <pc:sldMk cId="268507922" sldId="256"/>
-            <ac:picMk id="5" creationId="{87EBA3DF-FF8E-5AAC-DBB1-E166D7CDA0AC}"/>
-          </ac:picMkLst>
-        </pc:picChg>
-        <pc:picChg chg="add del mod">
-          <ac:chgData name="Gilbert, Neil" userId="37be9f5c-8f28-415b-96d6-624acf93bb3f" providerId="ADAL" clId="{9561989A-6F4B-49C8-AB3D-2F38768059CC}" dt="2024-11-20T15:45:48.575" v="105" actId="478"/>
-          <ac:picMkLst>
-            <pc:docMk/>
-            <pc:sldMk cId="268507922" sldId="256"/>
-            <ac:picMk id="6" creationId="{AE0A68D5-4D1F-9D47-06D6-AB528E828AB6}"/>
-          </ac:picMkLst>
-        </pc:picChg>
-        <pc:picChg chg="add mod">
-          <ac:chgData name="Gilbert, Neil" userId="37be9f5c-8f28-415b-96d6-624acf93bb3f" providerId="ADAL" clId="{9561989A-6F4B-49C8-AB3D-2F38768059CC}" dt="2024-11-20T20:36:52.555" v="224" actId="164"/>
-          <ac:picMkLst>
-            <pc:docMk/>
-            <pc:sldMk cId="268507922" sldId="256"/>
-            <ac:picMk id="8" creationId="{51ED987C-0937-D95D-F8E1-2A4F8EF9F3D7}"/>
-          </ac:picMkLst>
-        </pc:picChg>
-        <pc:picChg chg="add del mod">
-          <ac:chgData name="Gilbert, Neil" userId="37be9f5c-8f28-415b-96d6-624acf93bb3f" providerId="ADAL" clId="{9561989A-6F4B-49C8-AB3D-2F38768059CC}" dt="2024-11-20T15:46:11.948" v="110" actId="478"/>
-          <ac:picMkLst>
-            <pc:docMk/>
-            <pc:sldMk cId="268507922" sldId="256"/>
-            <ac:picMk id="9" creationId="{AE3C2A4A-207D-9B3D-E2A5-B5640CA4BC8C}"/>
-          </ac:picMkLst>
-        </pc:picChg>
-        <pc:picChg chg="add mod">
-          <ac:chgData name="Gilbert, Neil" userId="37be9f5c-8f28-415b-96d6-624acf93bb3f" providerId="ADAL" clId="{9561989A-6F4B-49C8-AB3D-2F38768059CC}" dt="2024-11-20T20:36:52.555" v="224" actId="164"/>
-          <ac:picMkLst>
-            <pc:docMk/>
-            <pc:sldMk cId="268507922" sldId="256"/>
-            <ac:picMk id="11" creationId="{16FF750D-4091-51D2-6013-A6DDC5CB6B71}"/>
-          </ac:picMkLst>
-        </pc:picChg>
-        <pc:picChg chg="add mod">
-          <ac:chgData name="Gilbert, Neil" userId="37be9f5c-8f28-415b-96d6-624acf93bb3f" providerId="ADAL" clId="{9561989A-6F4B-49C8-AB3D-2F38768059CC}" dt="2024-11-20T20:36:52.555" v="224" actId="164"/>
-          <ac:picMkLst>
-            <pc:docMk/>
-            <pc:sldMk cId="268507922" sldId="256"/>
-            <ac:picMk id="12" creationId="{6F5AFEBD-68A4-D22A-9A1F-56DCDA88B0B2}"/>
-          </ac:picMkLst>
-        </pc:picChg>
-        <pc:picChg chg="add mod">
-          <ac:chgData name="Gilbert, Neil" userId="37be9f5c-8f28-415b-96d6-624acf93bb3f" providerId="ADAL" clId="{9561989A-6F4B-49C8-AB3D-2F38768059CC}" dt="2024-11-20T20:36:52.555" v="224" actId="164"/>
-          <ac:picMkLst>
-            <pc:docMk/>
-            <pc:sldMk cId="268507922" sldId="256"/>
-            <ac:picMk id="13" creationId="{362DF697-E4BF-B744-F31F-3E1FE661F785}"/>
-          </ac:picMkLst>
-        </pc:picChg>
-        <pc:picChg chg="add mod">
-          <ac:chgData name="Gilbert, Neil" userId="37be9f5c-8f28-415b-96d6-624acf93bb3f" providerId="ADAL" clId="{9561989A-6F4B-49C8-AB3D-2F38768059CC}" dt="2024-11-20T20:36:52.555" v="224" actId="164"/>
-          <ac:picMkLst>
-            <pc:docMk/>
-            <pc:sldMk cId="268507922" sldId="256"/>
-            <ac:picMk id="14" creationId="{DEF1755A-474F-B06D-264A-B8A9348E1DF7}"/>
-          </ac:picMkLst>
-        </pc:picChg>
-        <pc:picChg chg="add mod">
-          <ac:chgData name="Gilbert, Neil" userId="37be9f5c-8f28-415b-96d6-624acf93bb3f" providerId="ADAL" clId="{9561989A-6F4B-49C8-AB3D-2F38768059CC}" dt="2024-11-20T16:00:36.618" v="125"/>
-          <ac:picMkLst>
-            <pc:docMk/>
-            <pc:sldMk cId="268507922" sldId="256"/>
-            <ac:picMk id="16" creationId="{451CB7C5-B168-4522-ADF6-C534FB5E4BE9}"/>
-          </ac:picMkLst>
-        </pc:picChg>
-        <pc:picChg chg="add del mod ord">
-          <ac:chgData name="Gilbert, Neil" userId="37be9f5c-8f28-415b-96d6-624acf93bb3f" providerId="ADAL" clId="{9561989A-6F4B-49C8-AB3D-2F38768059CC}" dt="2024-11-20T20:34:34.105" v="194" actId="478"/>
-          <ac:picMkLst>
-            <pc:docMk/>
-            <pc:sldMk cId="268507922" sldId="256"/>
-            <ac:picMk id="18" creationId="{D62C9E56-33C6-7733-E1A6-24ACEF763372}"/>
-          </ac:picMkLst>
-        </pc:picChg>
-        <pc:picChg chg="add del mod ord">
-          <ac:chgData name="Gilbert, Neil" userId="37be9f5c-8f28-415b-96d6-624acf93bb3f" providerId="ADAL" clId="{9561989A-6F4B-49C8-AB3D-2F38768059CC}" dt="2024-11-20T16:36:23.665" v="140" actId="478"/>
-          <ac:picMkLst>
-            <pc:docMk/>
-            <pc:sldMk cId="268507922" sldId="256"/>
-            <ac:picMk id="20" creationId="{F22B8011-2FFE-060F-FBE1-6C70AD86389A}"/>
-          </ac:picMkLst>
-        </pc:picChg>
-        <pc:picChg chg="add del mod ord">
-          <ac:chgData name="Gilbert, Neil" userId="37be9f5c-8f28-415b-96d6-624acf93bb3f" providerId="ADAL" clId="{9561989A-6F4B-49C8-AB3D-2F38768059CC}" dt="2024-11-20T16:43:31.142" v="150" actId="478"/>
-          <ac:picMkLst>
-            <pc:docMk/>
-            <pc:sldMk cId="268507922" sldId="256"/>
-            <ac:picMk id="22" creationId="{FAB29666-FA3B-67EB-2B65-4CB22C7DEB80}"/>
-          </ac:picMkLst>
-        </pc:picChg>
-        <pc:picChg chg="add del mod ord modCrop">
-          <ac:chgData name="Gilbert, Neil" userId="37be9f5c-8f28-415b-96d6-624acf93bb3f" providerId="ADAL" clId="{9561989A-6F4B-49C8-AB3D-2F38768059CC}" dt="2024-11-20T16:52:11.544" v="161" actId="478"/>
-          <ac:picMkLst>
-            <pc:docMk/>
-            <pc:sldMk cId="268507922" sldId="256"/>
-            <ac:picMk id="24" creationId="{48E0C5BD-C6AE-A23F-5A32-6E7B3DE20CE6}"/>
-          </ac:picMkLst>
-        </pc:picChg>
-        <pc:picChg chg="add del mod ord">
-          <ac:chgData name="Gilbert, Neil" userId="37be9f5c-8f28-415b-96d6-624acf93bb3f" providerId="ADAL" clId="{9561989A-6F4B-49C8-AB3D-2F38768059CC}" dt="2024-11-20T16:53:35.827" v="174" actId="478"/>
-          <ac:picMkLst>
-            <pc:docMk/>
-            <pc:sldMk cId="268507922" sldId="256"/>
-            <ac:picMk id="26" creationId="{754ED612-96B4-0198-F7C9-EF906DECB6F3}"/>
-          </ac:picMkLst>
-        </pc:picChg>
-        <pc:picChg chg="add del mod ord modCrop">
-          <ac:chgData name="Gilbert, Neil" userId="37be9f5c-8f28-415b-96d6-624acf93bb3f" providerId="ADAL" clId="{9561989A-6F4B-49C8-AB3D-2F38768059CC}" dt="2024-11-20T16:54:21.870" v="186" actId="478"/>
-          <ac:picMkLst>
-            <pc:docMk/>
-            <pc:sldMk cId="268507922" sldId="256"/>
-            <ac:picMk id="28" creationId="{6AC2E5E2-A513-7F3A-C938-23976B13F7D1}"/>
-          </ac:picMkLst>
-        </pc:picChg>
-        <pc:picChg chg="add mod ord">
-          <ac:chgData name="Gilbert, Neil" userId="37be9f5c-8f28-415b-96d6-624acf93bb3f" providerId="ADAL" clId="{9561989A-6F4B-49C8-AB3D-2F38768059CC}" dt="2024-11-20T20:36:52.555" v="224" actId="164"/>
-          <ac:picMkLst>
-            <pc:docMk/>
-            <pc:sldMk cId="268507922" sldId="256"/>
-            <ac:picMk id="30" creationId="{47E2A885-0C8B-A266-6142-127E956029E3}"/>
-          </ac:picMkLst>
-        </pc:picChg>
-        <pc:picChg chg="add mod ord">
-          <ac:chgData name="Gilbert, Neil" userId="37be9f5c-8f28-415b-96d6-624acf93bb3f" providerId="ADAL" clId="{9561989A-6F4B-49C8-AB3D-2F38768059CC}" dt="2024-11-20T20:36:52.555" v="224" actId="164"/>
-          <ac:picMkLst>
-            <pc:docMk/>
-            <pc:sldMk cId="268507922" sldId="256"/>
-            <ac:picMk id="32" creationId="{F44BB6CA-6E35-B19D-40D0-141E4DF5792E}"/>
-          </ac:picMkLst>
-        </pc:picChg>
         <pc:picChg chg="mod">
           <ac:chgData name="Gilbert, Neil" userId="37be9f5c-8f28-415b-96d6-624acf93bb3f" providerId="ADAL" clId="{9561989A-6F4B-49C8-AB3D-2F38768059CC}" dt="2024-11-20T20:39:16.894" v="226"/>
           <ac:picMkLst>
             <pc:docMk/>
             <pc:sldMk cId="268507922" sldId="256"/>
             <ac:picMk id="35" creationId="{47E2A885-0C8B-A266-6142-127E956029E3}"/>
-          </ac:picMkLst>
-        </pc:picChg>
-        <pc:picChg chg="del mod">
-          <ac:chgData name="Gilbert, Neil" userId="37be9f5c-8f28-415b-96d6-624acf93bb3f" providerId="ADAL" clId="{9561989A-6F4B-49C8-AB3D-2F38768059CC}" dt="2024-11-20T21:06:09.585" v="227" actId="478"/>
-          <ac:picMkLst>
-            <pc:docMk/>
-            <pc:sldMk cId="268507922" sldId="256"/>
-            <ac:picMk id="36" creationId="{F44BB6CA-6E35-B19D-40D0-141E4DF5792E}"/>
           </ac:picMkLst>
         </pc:picChg>
         <pc:picChg chg="mod">
@@ -458,86 +234,38 @@
             <ac:picMk id="47" creationId="{5CA18B89-C216-9E0D-81D0-24D7A704F942}"/>
           </ac:picMkLst>
         </pc:picChg>
-        <pc:picChg chg="del">
-          <ac:chgData name="Gilbert, Neil" userId="37be9f5c-8f28-415b-96d6-624acf93bb3f" providerId="ADAL" clId="{9561989A-6F4B-49C8-AB3D-2F38768059CC}" dt="2024-11-11T16:12:24.092" v="0" actId="478"/>
-          <ac:picMkLst>
+      </pc:sldChg>
+    </pc:docChg>
+  </pc:docChgLst>
+  <pc:docChgLst>
+    <pc:chgData name="Gilbert, Neil" userId="37be9f5c-8f28-415b-96d6-624acf93bb3f" providerId="ADAL" clId="{E47290D8-570C-4370-B6F6-1AF3FEE279C2}"/>
+    <pc:docChg chg="modSld">
+      <pc:chgData name="Gilbert, Neil" userId="37be9f5c-8f28-415b-96d6-624acf93bb3f" providerId="ADAL" clId="{E47290D8-570C-4370-B6F6-1AF3FEE279C2}" dt="2024-12-09T18:06:26.019" v="3" actId="20577"/>
+      <pc:docMkLst>
+        <pc:docMk/>
+      </pc:docMkLst>
+      <pc:sldChg chg="modSp mod">
+        <pc:chgData name="Gilbert, Neil" userId="37be9f5c-8f28-415b-96d6-624acf93bb3f" providerId="ADAL" clId="{E47290D8-570C-4370-B6F6-1AF3FEE279C2}" dt="2024-12-09T18:06:26.019" v="3" actId="20577"/>
+        <pc:sldMkLst>
+          <pc:docMk/>
+          <pc:sldMk cId="268507922" sldId="256"/>
+        </pc:sldMkLst>
+        <pc:spChg chg="mod">
+          <ac:chgData name="Gilbert, Neil" userId="37be9f5c-8f28-415b-96d6-624acf93bb3f" providerId="ADAL" clId="{E47290D8-570C-4370-B6F6-1AF3FEE279C2}" dt="2024-12-09T18:06:23.551" v="1" actId="20577"/>
+          <ac:spMkLst>
             <pc:docMk/>
             <pc:sldMk cId="268507922" sldId="256"/>
-            <ac:picMk id="1024" creationId="{932986F5-4457-C306-066F-4BAA3FB5326D}"/>
-          </ac:picMkLst>
-        </pc:picChg>
-        <pc:picChg chg="add mod">
-          <ac:chgData name="Gilbert, Neil" userId="37be9f5c-8f28-415b-96d6-624acf93bb3f" providerId="ADAL" clId="{9561989A-6F4B-49C8-AB3D-2F38768059CC}" dt="2024-11-11T16:15:28.775" v="52" actId="732"/>
-          <ac:picMkLst>
+            <ac:spMk id="44" creationId="{133F10ED-44CE-B5CD-46F0-631A8C237167}"/>
+          </ac:spMkLst>
+        </pc:spChg>
+        <pc:spChg chg="mod">
+          <ac:chgData name="Gilbert, Neil" userId="37be9f5c-8f28-415b-96d6-624acf93bb3f" providerId="ADAL" clId="{E47290D8-570C-4370-B6F6-1AF3FEE279C2}" dt="2024-12-09T18:06:26.019" v="3" actId="20577"/>
+          <ac:spMkLst>
             <pc:docMk/>
             <pc:sldMk cId="268507922" sldId="256"/>
-            <ac:picMk id="1026" creationId="{4EDCB04E-4F1B-AA1B-6754-6A9FA2007BF4}"/>
-          </ac:picMkLst>
-        </pc:picChg>
-        <pc:picChg chg="del mod">
-          <ac:chgData name="Gilbert, Neil" userId="37be9f5c-8f28-415b-96d6-624acf93bb3f" providerId="ADAL" clId="{9561989A-6F4B-49C8-AB3D-2F38768059CC}" dt="2024-11-20T16:00:39.254" v="127" actId="478"/>
-          <ac:picMkLst>
-            <pc:docMk/>
-            <pc:sldMk cId="268507922" sldId="256"/>
-            <ac:picMk id="1027" creationId="{F06224F9-3643-2D7A-B2B8-B48D44578F02}"/>
-          </ac:picMkLst>
-        </pc:picChg>
-        <pc:picChg chg="add del mod">
-          <ac:chgData name="Gilbert, Neil" userId="37be9f5c-8f28-415b-96d6-624acf93bb3f" providerId="ADAL" clId="{9561989A-6F4B-49C8-AB3D-2F38768059CC}" dt="2024-11-20T15:44:07.891" v="76" actId="478"/>
-          <ac:picMkLst>
-            <pc:docMk/>
-            <pc:sldMk cId="268507922" sldId="256"/>
-            <ac:picMk id="1028" creationId="{E8DA3D06-2430-DE6A-27BF-AF14CF272D28}"/>
-          </ac:picMkLst>
-        </pc:picChg>
-        <pc:picChg chg="del mod">
-          <ac:chgData name="Gilbert, Neil" userId="37be9f5c-8f28-415b-96d6-624acf93bb3f" providerId="ADAL" clId="{9561989A-6F4B-49C8-AB3D-2F38768059CC}" dt="2024-11-20T15:44:09.386" v="77" actId="478"/>
-          <ac:picMkLst>
-            <pc:docMk/>
-            <pc:sldMk cId="268507922" sldId="256"/>
-            <ac:picMk id="1030" creationId="{5CBBDF78-6694-9CD2-4044-C5D5325D8351}"/>
-          </ac:picMkLst>
-        </pc:picChg>
-        <pc:picChg chg="del mod">
-          <ac:chgData name="Gilbert, Neil" userId="37be9f5c-8f28-415b-96d6-624acf93bb3f" providerId="ADAL" clId="{9561989A-6F4B-49C8-AB3D-2F38768059CC}" dt="2024-11-20T15:44:10.456" v="78" actId="478"/>
-          <ac:picMkLst>
-            <pc:docMk/>
-            <pc:sldMk cId="268507922" sldId="256"/>
-            <ac:picMk id="1031" creationId="{AABEB834-A9BD-3314-9181-8800E60D172B}"/>
-          </ac:picMkLst>
-        </pc:picChg>
-        <pc:picChg chg="del mod">
-          <ac:chgData name="Gilbert, Neil" userId="37be9f5c-8f28-415b-96d6-624acf93bb3f" providerId="ADAL" clId="{9561989A-6F4B-49C8-AB3D-2F38768059CC}" dt="2024-11-11T16:16:42.841" v="71" actId="478"/>
-          <ac:picMkLst>
-            <pc:docMk/>
-            <pc:sldMk cId="268507922" sldId="256"/>
-            <ac:picMk id="1032" creationId="{1A33441B-D278-17F6-CA04-D633E2D12AF0}"/>
-          </ac:picMkLst>
-        </pc:picChg>
-        <pc:picChg chg="del mod">
-          <ac:chgData name="Gilbert, Neil" userId="37be9f5c-8f28-415b-96d6-624acf93bb3f" providerId="ADAL" clId="{9561989A-6F4B-49C8-AB3D-2F38768059CC}" dt="2024-11-20T15:44:06.040" v="74" actId="478"/>
-          <ac:picMkLst>
-            <pc:docMk/>
-            <pc:sldMk cId="268507922" sldId="256"/>
-            <ac:picMk id="1033" creationId="{C5C4C95C-60D7-A17E-1721-3D0424FBBE6B}"/>
-          </ac:picMkLst>
-        </pc:picChg>
-        <pc:picChg chg="del mod">
-          <ac:chgData name="Gilbert, Neil" userId="37be9f5c-8f28-415b-96d6-624acf93bb3f" providerId="ADAL" clId="{9561989A-6F4B-49C8-AB3D-2F38768059CC}" dt="2024-11-20T15:44:07.096" v="75" actId="478"/>
-          <ac:picMkLst>
-            <pc:docMk/>
-            <pc:sldMk cId="268507922" sldId="256"/>
-            <ac:picMk id="1034" creationId="{23F1F054-4E3E-5218-3510-1C1F1D2ACFEC}"/>
-          </ac:picMkLst>
-        </pc:picChg>
-        <pc:picChg chg="del mod">
-          <ac:chgData name="Gilbert, Neil" userId="37be9f5c-8f28-415b-96d6-624acf93bb3f" providerId="ADAL" clId="{9561989A-6F4B-49C8-AB3D-2F38768059CC}" dt="2024-11-11T16:16:33.210" v="66" actId="478"/>
-          <ac:picMkLst>
-            <pc:docMk/>
-            <pc:sldMk cId="268507922" sldId="256"/>
-            <ac:picMk id="1035" creationId="{066A2B18-A35A-2BA4-79C1-5F6BD2C7DAB1}"/>
-          </ac:picMkLst>
-        </pc:picChg>
+            <ac:spMk id="45" creationId="{3C2ABE41-10A5-70FD-8685-6D280AD1D057}"/>
+          </ac:spMkLst>
+        </pc:spChg>
       </pc:sldChg>
     </pc:docChg>
   </pc:docChgLst>
@@ -675,7 +403,7 @@
           <a:p>
             <a:fld id="{2F68B2EA-A892-46A1-BEA1-475FA51A3827}" type="datetimeFigureOut">
               <a:rPr lang="en-US" smtClean="0"/>
-              <a:t>11/20/2024</a:t>
+              <a:t>12/9/2024</a:t>
             </a:fld>
             <a:endParaRPr lang="en-US"/>
           </a:p>
@@ -845,7 +573,7 @@
           <a:p>
             <a:fld id="{2F68B2EA-A892-46A1-BEA1-475FA51A3827}" type="datetimeFigureOut">
               <a:rPr lang="en-US" smtClean="0"/>
-              <a:t>11/20/2024</a:t>
+              <a:t>12/9/2024</a:t>
             </a:fld>
             <a:endParaRPr lang="en-US"/>
           </a:p>
@@ -1025,7 +753,7 @@
           <a:p>
             <a:fld id="{2F68B2EA-A892-46A1-BEA1-475FA51A3827}" type="datetimeFigureOut">
               <a:rPr lang="en-US" smtClean="0"/>
-              <a:t>11/20/2024</a:t>
+              <a:t>12/9/2024</a:t>
             </a:fld>
             <a:endParaRPr lang="en-US"/>
           </a:p>
@@ -1195,7 +923,7 @@
           <a:p>
             <a:fld id="{2F68B2EA-A892-46A1-BEA1-475FA51A3827}" type="datetimeFigureOut">
               <a:rPr lang="en-US" smtClean="0"/>
-              <a:t>11/20/2024</a:t>
+              <a:t>12/9/2024</a:t>
             </a:fld>
             <a:endParaRPr lang="en-US"/>
           </a:p>
@@ -1441,7 +1169,7 @@
           <a:p>
             <a:fld id="{2F68B2EA-A892-46A1-BEA1-475FA51A3827}" type="datetimeFigureOut">
               <a:rPr lang="en-US" smtClean="0"/>
-              <a:t>11/20/2024</a:t>
+              <a:t>12/9/2024</a:t>
             </a:fld>
             <a:endParaRPr lang="en-US"/>
           </a:p>
@@ -1673,7 +1401,7 @@
           <a:p>
             <a:fld id="{2F68B2EA-A892-46A1-BEA1-475FA51A3827}" type="datetimeFigureOut">
               <a:rPr lang="en-US" smtClean="0"/>
-              <a:t>11/20/2024</a:t>
+              <a:t>12/9/2024</a:t>
             </a:fld>
             <a:endParaRPr lang="en-US"/>
           </a:p>
@@ -2040,7 +1768,7 @@
           <a:p>
             <a:fld id="{2F68B2EA-A892-46A1-BEA1-475FA51A3827}" type="datetimeFigureOut">
               <a:rPr lang="en-US" smtClean="0"/>
-              <a:t>11/20/2024</a:t>
+              <a:t>12/9/2024</a:t>
             </a:fld>
             <a:endParaRPr lang="en-US"/>
           </a:p>
@@ -2158,7 +1886,7 @@
           <a:p>
             <a:fld id="{2F68B2EA-A892-46A1-BEA1-475FA51A3827}" type="datetimeFigureOut">
               <a:rPr lang="en-US" smtClean="0"/>
-              <a:t>11/20/2024</a:t>
+              <a:t>12/9/2024</a:t>
             </a:fld>
             <a:endParaRPr lang="en-US"/>
           </a:p>
@@ -2253,7 +1981,7 @@
           <a:p>
             <a:fld id="{2F68B2EA-A892-46A1-BEA1-475FA51A3827}" type="datetimeFigureOut">
               <a:rPr lang="en-US" smtClean="0"/>
-              <a:t>11/20/2024</a:t>
+              <a:t>12/9/2024</a:t>
             </a:fld>
             <a:endParaRPr lang="en-US"/>
           </a:p>
@@ -2530,7 +2258,7 @@
           <a:p>
             <a:fld id="{2F68B2EA-A892-46A1-BEA1-475FA51A3827}" type="datetimeFigureOut">
               <a:rPr lang="en-US" smtClean="0"/>
-              <a:t>11/20/2024</a:t>
+              <a:t>12/9/2024</a:t>
             </a:fld>
             <a:endParaRPr lang="en-US"/>
           </a:p>
@@ -2787,7 +2515,7 @@
           <a:p>
             <a:fld id="{2F68B2EA-A892-46A1-BEA1-475FA51A3827}" type="datetimeFigureOut">
               <a:rPr lang="en-US" smtClean="0"/>
-              <a:t>11/20/2024</a:t>
+              <a:t>12/9/2024</a:t>
             </a:fld>
             <a:endParaRPr lang="en-US"/>
           </a:p>
@@ -3000,7 +2728,7 @@
           <a:p>
             <a:fld id="{2F68B2EA-A892-46A1-BEA1-475FA51A3827}" type="datetimeFigureOut">
               <a:rPr lang="en-US" smtClean="0"/>
-              <a:t>11/20/2024</a:t>
+              <a:t>12/9/2024</a:t>
             </a:fld>
             <a:endParaRPr lang="en-US"/>
           </a:p>
@@ -3569,7 +3297,7 @@
                       <a:schemeClr val="tx1"/>
                     </a:solidFill>
                   </a:rPr>
-                  <a:t>(a)</a:t>
+                  <a:t>(A)</a:t>
                 </a:r>
               </a:p>
             </p:txBody>
@@ -3621,13 +3349,18 @@
               <a:p>
                 <a:pPr algn="ctr"/>
                 <a:r>
-                  <a:rPr lang="en-US" sz="1000" b="1" dirty="0">
+                  <a:rPr lang="en-US" sz="1000" b="1">
                     <a:solidFill>
                       <a:schemeClr val="tx1"/>
                     </a:solidFill>
                   </a:rPr>
-                  <a:t>(b)</a:t>
+                  <a:t>(B)</a:t>
                 </a:r>
+                <a:endParaRPr lang="en-US" sz="1000" b="1" dirty="0">
+                  <a:solidFill>
+                    <a:schemeClr val="tx1"/>
+                  </a:solidFill>
+                </a:endParaRPr>
               </a:p>
             </p:txBody>
           </p:sp>

</xml_diff>